<commit_message>
some edits to process diagram ppt
</commit_message>
<xml_diff>
--- a/ProcessDiagram.pptx
+++ b/ProcessDiagram.pptx
@@ -5,20 +5,23 @@
     <p:sldMasterId id="2147483648" r:id="rId1"/>
   </p:sldMasterIdLst>
   <p:notesMasterIdLst>
-    <p:notesMasterId r:id="rId13"/>
+    <p:notesMasterId r:id="rId16"/>
   </p:notesMasterIdLst>
   <p:sldIdLst>
     <p:sldId id="257" r:id="rId2"/>
-    <p:sldId id="266" r:id="rId3"/>
-    <p:sldId id="259" r:id="rId4"/>
-    <p:sldId id="267" r:id="rId5"/>
-    <p:sldId id="262" r:id="rId6"/>
-    <p:sldId id="268" r:id="rId7"/>
-    <p:sldId id="263" r:id="rId8"/>
-    <p:sldId id="269" r:id="rId9"/>
-    <p:sldId id="260" r:id="rId10"/>
-    <p:sldId id="264" r:id="rId11"/>
-    <p:sldId id="270" r:id="rId12"/>
+    <p:sldId id="273" r:id="rId3"/>
+    <p:sldId id="266" r:id="rId4"/>
+    <p:sldId id="259" r:id="rId5"/>
+    <p:sldId id="267" r:id="rId6"/>
+    <p:sldId id="262" r:id="rId7"/>
+    <p:sldId id="268" r:id="rId8"/>
+    <p:sldId id="263" r:id="rId9"/>
+    <p:sldId id="269" r:id="rId10"/>
+    <p:sldId id="271" r:id="rId11"/>
+    <p:sldId id="260" r:id="rId12"/>
+    <p:sldId id="264" r:id="rId13"/>
+    <p:sldId id="270" r:id="rId14"/>
+    <p:sldId id="272" r:id="rId15"/>
   </p:sldIdLst>
   <p:sldSz cx="12192000" cy="6858000"/>
   <p:notesSz cx="6858000" cy="9144000"/>
@@ -180,6 +183,71 @@
     <ac:deMkLst xmlns:ac="http://schemas.microsoft.com/office/drawing/2013/main/command">
       <pc:docMk xmlns:pc="http://schemas.microsoft.com/office/powerpoint/2013/main/command"/>
       <pc:sldMk xmlns:pc="http://schemas.microsoft.com/office/powerpoint/2013/main/command" cId="2701233146" sldId="257"/>
+      <ac:grpSpMk id="114" creationId="{7831DC29-7EF2-46A8-9D55-42EEA61C12B9}"/>
+    </ac:deMkLst>
+    <p188:txBody>
+      <a:bodyPr/>
+      <a:lstStyle/>
+      <a:p>
+        <a:r>
+          <a:rPr lang="en-US"/>
+          <a:t>all about metrics, maximizing number of goals achieved and the degree to which they're achieved</a:t>
+        </a:r>
+      </a:p>
+    </p188:txBody>
+  </p188:cm>
+</p188:cmLst>
+</file>
+
+<file path=ppt/comments/modernComment_111_7251202A.xml><?xml version="1.0" encoding="utf-8"?>
+<p188:cmLst xmlns:a="http://schemas.openxmlformats.org/drawingml/2006/main" xmlns:r="http://schemas.openxmlformats.org/officeDocument/2006/relationships" xmlns:p188="http://schemas.microsoft.com/office/powerpoint/2018/8/main">
+  <p188:cm id="{E058BAC2-A0B5-4E37-B49E-2353ADC63885}" authorId="{61790E84-7BA3-9037-9FCC-FBFA9FAD3E7F}" created="2022-02-14T18:25:08.387">
+    <ac:deMkLst xmlns:ac="http://schemas.microsoft.com/office/drawing/2013/main/command">
+      <pc:docMk xmlns:pc="http://schemas.microsoft.com/office/powerpoint/2013/main/command"/>
+      <pc:sldMk xmlns:pc="http://schemas.microsoft.com/office/powerpoint/2013/main/command" cId="1917919274" sldId="273"/>
+      <ac:grpSpMk id="296" creationId="{DDCA211A-FDA6-4008-8ED1-755FB20C7FD9}"/>
+    </ac:deMkLst>
+    <p188:replyLst>
+      <p188:reply id="{276F68EC-4F19-4A8A-AE7D-55A7B9743EE4}" authorId="{61790E84-7BA3-9037-9FCC-FBFA9FAD3E7F}" created="2022-02-14T18:25:32.445">
+        <p188:txBody>
+          <a:bodyPr/>
+          <a:lstStyle/>
+          <a:p>
+            <a:r>
+              <a:rPr lang="en-US"/>
+              <a:t>primarily metrics and levers</a:t>
+            </a:r>
+          </a:p>
+        </p188:txBody>
+      </p188:reply>
+      <p188:reply id="{17AC9F9D-4D3D-4C2F-9B8A-980A58FE4FCB}" authorId="{61790E84-7BA3-9037-9FCC-FBFA9FAD3E7F}" created="2022-02-14T18:29:50.026">
+        <p188:txBody>
+          <a:bodyPr/>
+          <a:lstStyle/>
+          <a:p>
+            <a:r>
+              <a:rPr lang="en-US"/>
+              <a:t>using expected values of uncertainty distributions</a:t>
+            </a:r>
+          </a:p>
+        </p188:txBody>
+      </p188:reply>
+    </p188:replyLst>
+    <p188:txBody>
+      <a:bodyPr/>
+      <a:lstStyle/>
+      <a:p>
+        <a:r>
+          <a:rPr lang="en-US"/>
+          <a:t>not yet accounting for uncertainties</a:t>
+        </a:r>
+      </a:p>
+    </p188:txBody>
+  </p188:cm>
+  <p188:cm id="{14F7D445-4C20-42C2-AF87-0EE9651900F2}" authorId="{61790E84-7BA3-9037-9FCC-FBFA9FAD3E7F}" created="2022-02-14T18:30:13.140">
+    <ac:deMkLst xmlns:ac="http://schemas.microsoft.com/office/drawing/2013/main/command">
+      <pc:docMk xmlns:pc="http://schemas.microsoft.com/office/powerpoint/2013/main/command"/>
+      <pc:sldMk xmlns:pc="http://schemas.microsoft.com/office/powerpoint/2013/main/command" cId="1917919274" sldId="273"/>
       <ac:grpSpMk id="114" creationId="{7831DC29-7EF2-46A8-9D55-42EEA61C12B9}"/>
     </ac:deMkLst>
     <p188:txBody>
@@ -16818,7 +16886,7 @@
           <a:p>
             <a:fld id="{FB46BE99-5E4C-4614-8A4B-2DA348AC1F1F}" type="datetimeFigureOut">
               <a:rPr lang="en-US" smtClean="0"/>
-              <a:t>2/23/2022</a:t>
+              <a:t>2/25/2022</a:t>
             </a:fld>
             <a:endParaRPr lang="en-US"/>
           </a:p>
@@ -17221,6 +17289,142 @@
 </p:notes>
 </file>
 
+<file path=ppt/notesSlides/notesSlide2.xml><?xml version="1.0" encoding="utf-8"?>
+<p:notes xmlns:a="http://schemas.openxmlformats.org/drawingml/2006/main" xmlns:r="http://schemas.openxmlformats.org/officeDocument/2006/relationships" xmlns:p="http://schemas.openxmlformats.org/presentationml/2006/main">
+  <p:cSld>
+    <p:spTree>
+      <p:nvGrpSpPr>
+        <p:cNvPr id="1" name=""/>
+        <p:cNvGrpSpPr/>
+        <p:nvPr/>
+      </p:nvGrpSpPr>
+      <p:grpSpPr>
+        <a:xfrm>
+          <a:off x="0" y="0"/>
+          <a:ext cx="0" cy="0"/>
+          <a:chOff x="0" y="0"/>
+          <a:chExt cx="0" cy="0"/>
+        </a:xfrm>
+      </p:grpSpPr>
+      <p:sp>
+        <p:nvSpPr>
+          <p:cNvPr id="2" name="Slide Image Placeholder 1"/>
+          <p:cNvSpPr>
+            <a:spLocks noGrp="1" noRot="1" noChangeAspect="1"/>
+          </p:cNvSpPr>
+          <p:nvPr>
+            <p:ph type="sldImg"/>
+          </p:nvPr>
+        </p:nvSpPr>
+        <p:spPr/>
+      </p:sp>
+      <p:sp>
+        <p:nvSpPr>
+          <p:cNvPr id="3" name="Notes Placeholder 2"/>
+          <p:cNvSpPr>
+            <a:spLocks noGrp="1"/>
+          </p:cNvSpPr>
+          <p:nvPr>
+            <p:ph type="body" idx="1"/>
+          </p:nvPr>
+        </p:nvSpPr>
+        <p:spPr/>
+        <p:txBody>
+          <a:bodyPr/>
+          <a:lstStyle/>
+          <a:p>
+            <a:r>
+              <a:rPr lang="en-US" dirty="0"/>
+              <a:t>CEEP TBD</a:t>
+            </a:r>
+          </a:p>
+          <a:p>
+            <a:endParaRPr lang="en-US" dirty="0"/>
+          </a:p>
+          <a:p>
+            <a:r>
+              <a:rPr lang="en-US" dirty="0"/>
+              <a:t>Vulnerability assessment: exploratory modeling (taking one strategy and simulating it under various future states of the world), results from exploratory modeling and inform scenario discovery (when does it pass/when does it fail), PRIM (scenario discovery tool)</a:t>
+            </a:r>
+          </a:p>
+          <a:p>
+            <a:endParaRPr lang="en-US" dirty="0"/>
+          </a:p>
+          <a:p>
+            <a:r>
+              <a:rPr lang="en-US" dirty="0"/>
+              <a:t>Tradeoff analysis: cba, qualitative, no super specific tool…are there other methods?</a:t>
+            </a:r>
+          </a:p>
+          <a:p>
+            <a:endParaRPr lang="en-US" dirty="0"/>
+          </a:p>
+          <a:p>
+            <a:r>
+              <a:rPr lang="en-US" dirty="0"/>
+              <a:t>What varies between 2 and 3 when dealing with uncertainties</a:t>
+            </a:r>
+          </a:p>
+          <a:p>
+            <a:endParaRPr lang="en-US" dirty="0"/>
+          </a:p>
+          <a:p>
+            <a:r>
+              <a:rPr lang="en-US" dirty="0"/>
+              <a:t>Stakeholder consultations/expert judgements</a:t>
+            </a:r>
+          </a:p>
+          <a:p>
+            <a:endParaRPr lang="en-US" dirty="0"/>
+          </a:p>
+          <a:p>
+            <a:r>
+              <a:rPr lang="en-US" dirty="0" err="1"/>
+              <a:t>REOpt</a:t>
+            </a:r>
+            <a:r>
+              <a:rPr lang="en-US" dirty="0"/>
+              <a:t> in BOTH 2 and 3 and 4 (map of levers and uncertainties to metrics)</a:t>
+            </a:r>
+          </a:p>
+        </p:txBody>
+      </p:sp>
+      <p:sp>
+        <p:nvSpPr>
+          <p:cNvPr id="4" name="Slide Number Placeholder 3"/>
+          <p:cNvSpPr>
+            <a:spLocks noGrp="1"/>
+          </p:cNvSpPr>
+          <p:nvPr>
+            <p:ph type="sldNum" sz="quarter" idx="5"/>
+          </p:nvPr>
+        </p:nvSpPr>
+        <p:spPr/>
+        <p:txBody>
+          <a:bodyPr/>
+          <a:lstStyle/>
+          <a:p>
+            <a:fld id="{E9CC3D0C-4B71-4C5C-98D3-6CE005482934}" type="slidenum">
+              <a:rPr lang="en-US" smtClean="0"/>
+              <a:t>2</a:t>
+            </a:fld>
+            <a:endParaRPr lang="en-US"/>
+          </a:p>
+        </p:txBody>
+      </p:sp>
+    </p:spTree>
+    <p:extLst>
+      <p:ext uri="{BB962C8B-B14F-4D97-AF65-F5344CB8AC3E}">
+        <p14:creationId xmlns:p14="http://schemas.microsoft.com/office/powerpoint/2010/main" val="2986111253"/>
+      </p:ext>
+    </p:extLst>
+  </p:cSld>
+  <p:clrMapOvr>
+    <a:masterClrMapping/>
+  </p:clrMapOvr>
+</p:notes>
+</file>
+
 <file path=ppt/slideLayouts/slideLayout1.xml><?xml version="1.0" encoding="utf-8"?>
 <p:sldLayout xmlns:a="http://schemas.openxmlformats.org/drawingml/2006/main" xmlns:r="http://schemas.openxmlformats.org/officeDocument/2006/relationships" xmlns:p="http://schemas.openxmlformats.org/presentationml/2006/main" type="title" preserve="1">
   <p:cSld name="Title Slide">
@@ -17368,7 +17572,7 @@
           <a:p>
             <a:fld id="{50599592-2AF7-4E61-905F-05ADC84CECD8}" type="datetimeFigureOut">
               <a:rPr lang="en-US" smtClean="0"/>
-              <a:t>2/23/2022</a:t>
+              <a:t>2/25/2022</a:t>
             </a:fld>
             <a:endParaRPr lang="en-US"/>
           </a:p>
@@ -17566,7 +17770,7 @@
           <a:p>
             <a:fld id="{50599592-2AF7-4E61-905F-05ADC84CECD8}" type="datetimeFigureOut">
               <a:rPr lang="en-US" smtClean="0"/>
-              <a:t>2/23/2022</a:t>
+              <a:t>2/25/2022</a:t>
             </a:fld>
             <a:endParaRPr lang="en-US"/>
           </a:p>
@@ -17774,7 +17978,7 @@
           <a:p>
             <a:fld id="{50599592-2AF7-4E61-905F-05ADC84CECD8}" type="datetimeFigureOut">
               <a:rPr lang="en-US" smtClean="0"/>
-              <a:t>2/23/2022</a:t>
+              <a:t>2/25/2022</a:t>
             </a:fld>
             <a:endParaRPr lang="en-US"/>
           </a:p>
@@ -17949,7 +18153,7 @@
           <a:p>
             <a:fld id="{50599592-2AF7-4E61-905F-05ADC84CECD8}" type="datetimeFigureOut">
               <a:rPr lang="en-US" smtClean="0"/>
-              <a:t>2/23/2022</a:t>
+              <a:t>2/25/2022</a:t>
             </a:fld>
             <a:endParaRPr lang="en-US"/>
           </a:p>
@@ -18263,7 +18467,7 @@
           <a:p>
             <a:fld id="{50599592-2AF7-4E61-905F-05ADC84CECD8}" type="datetimeFigureOut">
               <a:rPr lang="en-US" smtClean="0"/>
-              <a:t>2/23/2022</a:t>
+              <a:t>2/25/2022</a:t>
             </a:fld>
             <a:endParaRPr lang="en-US"/>
           </a:p>
@@ -18528,7 +18732,7 @@
           <a:p>
             <a:fld id="{50599592-2AF7-4E61-905F-05ADC84CECD8}" type="datetimeFigureOut">
               <a:rPr lang="en-US" smtClean="0"/>
-              <a:t>2/23/2022</a:t>
+              <a:t>2/25/2022</a:t>
             </a:fld>
             <a:endParaRPr lang="en-US"/>
           </a:p>
@@ -18940,7 +19144,7 @@
           <a:p>
             <a:fld id="{50599592-2AF7-4E61-905F-05ADC84CECD8}" type="datetimeFigureOut">
               <a:rPr lang="en-US" smtClean="0"/>
-              <a:t>2/23/2022</a:t>
+              <a:t>2/25/2022</a:t>
             </a:fld>
             <a:endParaRPr lang="en-US"/>
           </a:p>
@@ -19092,7 +19296,7 @@
           <a:p>
             <a:fld id="{50599592-2AF7-4E61-905F-05ADC84CECD8}" type="datetimeFigureOut">
               <a:rPr lang="en-US" smtClean="0"/>
-              <a:t>2/23/2022</a:t>
+              <a:t>2/25/2022</a:t>
             </a:fld>
             <a:endParaRPr lang="en-US"/>
           </a:p>
@@ -19205,7 +19409,7 @@
           <a:p>
             <a:fld id="{50599592-2AF7-4E61-905F-05ADC84CECD8}" type="datetimeFigureOut">
               <a:rPr lang="en-US" smtClean="0"/>
-              <a:t>2/23/2022</a:t>
+              <a:t>2/25/2022</a:t>
             </a:fld>
             <a:endParaRPr lang="en-US"/>
           </a:p>
@@ -19516,7 +19720,7 @@
           <a:p>
             <a:fld id="{50599592-2AF7-4E61-905F-05ADC84CECD8}" type="datetimeFigureOut">
               <a:rPr lang="en-US" smtClean="0"/>
-              <a:t>2/23/2022</a:t>
+              <a:t>2/25/2022</a:t>
             </a:fld>
             <a:endParaRPr lang="en-US"/>
           </a:p>
@@ -19804,7 +20008,7 @@
           <a:p>
             <a:fld id="{50599592-2AF7-4E61-905F-05ADC84CECD8}" type="datetimeFigureOut">
               <a:rPr lang="en-US" smtClean="0"/>
-              <a:t>2/23/2022</a:t>
+              <a:t>2/25/2022</a:t>
             </a:fld>
             <a:endParaRPr lang="en-US"/>
           </a:p>
@@ -20045,7 +20249,7 @@
           <a:p>
             <a:fld id="{50599592-2AF7-4E61-905F-05ADC84CECD8}" type="datetimeFigureOut">
               <a:rPr lang="en-US" smtClean="0"/>
-              <a:t>2/23/2022</a:t>
+              <a:t>2/25/2022</a:t>
             </a:fld>
             <a:endParaRPr lang="en-US"/>
           </a:p>
@@ -22487,8 +22691,8 @@
         </p:nvSpPr>
         <p:spPr>
           <a:xfrm>
-            <a:off x="130208" y="77248"/>
-            <a:ext cx="1981891" cy="318216"/>
+            <a:off x="130207" y="77248"/>
+            <a:ext cx="4053917" cy="318216"/>
           </a:xfrm>
           <a:prstGeom prst="rect">
             <a:avLst/>
@@ -22524,6 +22728,7 @@
           <a:bodyPr rtlCol="0" anchor="t"/>
           <a:lstStyle/>
           <a:p>
+            <a:pPr algn="ctr"/>
             <a:r>
               <a:rPr lang="en-US" sz="1300" b="1" dirty="0">
                 <a:solidFill>
@@ -22532,7 +22737,7 @@
                 <a:latin typeface="Arial" panose="020B0604020202020204" pitchFamily="34" charset="0"/>
                 <a:cs typeface="Arial" panose="020B0604020202020204" pitchFamily="34" charset="0"/>
               </a:rPr>
-              <a:t>Process Flow Diagram</a:t>
+              <a:t>Process Flow Diagram: Robust Decision Making</a:t>
             </a:r>
             <a:endParaRPr lang="en-US" sz="1050" dirty="0">
               <a:solidFill>
@@ -23712,6 +23917,223 @@
           <a:chExt cx="0" cy="0"/>
         </a:xfrm>
       </p:grpSpPr>
+      <p:sp>
+        <p:nvSpPr>
+          <p:cNvPr id="2" name="Content Placeholder 1">
+            <a:extLst>
+              <a:ext uri="{FF2B5EF4-FFF2-40B4-BE49-F238E27FC236}">
+                <a16:creationId xmlns:a16="http://schemas.microsoft.com/office/drawing/2014/main" id="{1A1D7C65-4F73-495B-97A3-3C5CFBE1ACFC}"/>
+              </a:ext>
+            </a:extLst>
+          </p:cNvPr>
+          <p:cNvSpPr>
+            <a:spLocks noGrp="1"/>
+          </p:cNvSpPr>
+          <p:nvPr>
+            <p:ph idx="1"/>
+          </p:nvPr>
+        </p:nvSpPr>
+        <p:spPr/>
+        <p:txBody>
+          <a:bodyPr>
+            <a:normAutofit/>
+          </a:bodyPr>
+          <a:lstStyle/>
+          <a:p>
+            <a:r>
+              <a:rPr lang="en-US" dirty="0"/>
+              <a:t>Stakeholder type: </a:t>
+            </a:r>
+          </a:p>
+          <a:p>
+            <a:r>
+              <a:rPr lang="en-US" dirty="0"/>
+              <a:t>Year(s): 2017-present</a:t>
+            </a:r>
+          </a:p>
+          <a:p>
+            <a:r>
+              <a:rPr lang="en-US" dirty="0"/>
+              <a:t>Location: Butte County, CA</a:t>
+            </a:r>
+          </a:p>
+          <a:p>
+            <a:r>
+              <a:rPr lang="en-US" dirty="0"/>
+              <a:t>Relevant natural disaster: wildfire</a:t>
+            </a:r>
+          </a:p>
+          <a:p>
+            <a:r>
+              <a:rPr lang="en-US" dirty="0"/>
+              <a:t>Building characteristics</a:t>
+            </a:r>
+          </a:p>
+          <a:p>
+            <a:pPr lvl="1"/>
+            <a:r>
+              <a:rPr lang="en-US" dirty="0"/>
+              <a:t>Primary mission:</a:t>
+            </a:r>
+          </a:p>
+          <a:p>
+            <a:pPr lvl="1"/>
+            <a:r>
+              <a:rPr lang="en-US" dirty="0"/>
+              <a:t>Size:</a:t>
+            </a:r>
+          </a:p>
+          <a:p>
+            <a:r>
+              <a:rPr lang="en-US" dirty="0"/>
+              <a:t>Concerns:</a:t>
+            </a:r>
+          </a:p>
+          <a:p>
+            <a:pPr lvl="1"/>
+            <a:r>
+              <a:rPr lang="en-US" dirty="0" err="1"/>
+              <a:t>Slkdfj</a:t>
+            </a:r>
+            <a:endParaRPr lang="en-US" dirty="0"/>
+          </a:p>
+          <a:p>
+            <a:pPr lvl="1"/>
+            <a:r>
+              <a:rPr lang="en-US" dirty="0" err="1"/>
+              <a:t>Slkdjf</a:t>
+            </a:r>
+            <a:endParaRPr lang="en-US" dirty="0"/>
+          </a:p>
+          <a:p>
+            <a:pPr lvl="1"/>
+            <a:r>
+              <a:rPr lang="en-US" dirty="0" err="1"/>
+              <a:t>Sldkjf</a:t>
+            </a:r>
+            <a:endParaRPr lang="en-US" dirty="0"/>
+          </a:p>
+          <a:p>
+            <a:endParaRPr lang="en-US" dirty="0"/>
+          </a:p>
+        </p:txBody>
+      </p:sp>
+      <p:sp>
+        <p:nvSpPr>
+          <p:cNvPr id="3" name="Title 2">
+            <a:extLst>
+              <a:ext uri="{FF2B5EF4-FFF2-40B4-BE49-F238E27FC236}">
+                <a16:creationId xmlns:a16="http://schemas.microsoft.com/office/drawing/2014/main" id="{6276DE62-B85C-45CB-9902-654B2E08CDA0}"/>
+              </a:ext>
+            </a:extLst>
+          </p:cNvPr>
+          <p:cNvSpPr>
+            <a:spLocks noGrp="1"/>
+          </p:cNvSpPr>
+          <p:nvPr>
+            <p:ph type="title"/>
+          </p:nvPr>
+        </p:nvSpPr>
+        <p:spPr/>
+        <p:txBody>
+          <a:bodyPr/>
+          <a:lstStyle/>
+          <a:p>
+            <a:r>
+              <a:rPr lang="en-US" dirty="0"/>
+              <a:t>Hypothetical Customer #1</a:t>
+            </a:r>
+          </a:p>
+        </p:txBody>
+      </p:sp>
+    </p:spTree>
+    <p:extLst>
+      <p:ext uri="{BB962C8B-B14F-4D97-AF65-F5344CB8AC3E}">
+        <p14:creationId xmlns:p14="http://schemas.microsoft.com/office/powerpoint/2010/main" val="3506087460"/>
+      </p:ext>
+    </p:extLst>
+  </p:cSld>
+  <p:clrMapOvr>
+    <a:masterClrMapping/>
+  </p:clrMapOvr>
+</p:sld>
+</file>
+
+<file path=ppt/slides/slide11.xml><?xml version="1.0" encoding="utf-8"?>
+<p:sld xmlns:a="http://schemas.openxmlformats.org/drawingml/2006/main" xmlns:r="http://schemas.openxmlformats.org/officeDocument/2006/relationships" xmlns:p="http://schemas.openxmlformats.org/presentationml/2006/main">
+  <p:cSld>
+    <p:spTree>
+      <p:nvGrpSpPr>
+        <p:cNvPr id="1" name=""/>
+        <p:cNvGrpSpPr/>
+        <p:nvPr/>
+      </p:nvGrpSpPr>
+      <p:grpSpPr>
+        <a:xfrm>
+          <a:off x="0" y="0"/>
+          <a:ext cx="0" cy="0"/>
+          <a:chOff x="0" y="0"/>
+          <a:chExt cx="0" cy="0"/>
+        </a:xfrm>
+      </p:grpSpPr>
+      <p:sp>
+        <p:nvSpPr>
+          <p:cNvPr id="2" name="Title 1">
+            <a:extLst>
+              <a:ext uri="{FF2B5EF4-FFF2-40B4-BE49-F238E27FC236}">
+                <a16:creationId xmlns:a16="http://schemas.microsoft.com/office/drawing/2014/main" id="{AC0175D7-7AE2-44E6-81F4-93B23E3EACCF}"/>
+              </a:ext>
+            </a:extLst>
+          </p:cNvPr>
+          <p:cNvSpPr>
+            <a:spLocks noGrp="1"/>
+          </p:cNvSpPr>
+          <p:nvPr>
+            <p:ph type="title"/>
+          </p:nvPr>
+        </p:nvSpPr>
+        <p:spPr/>
+        <p:txBody>
+          <a:bodyPr/>
+          <a:lstStyle/>
+          <a:p>
+            <a:r>
+              <a:rPr lang="en-US" dirty="0"/>
+              <a:t>Stakeholder Concerns</a:t>
+            </a:r>
+          </a:p>
+        </p:txBody>
+      </p:sp>
+    </p:spTree>
+    <p:extLst>
+      <p:ext uri="{BB962C8B-B14F-4D97-AF65-F5344CB8AC3E}">
+        <p14:creationId xmlns:p14="http://schemas.microsoft.com/office/powerpoint/2010/main" val="2154757565"/>
+      </p:ext>
+    </p:extLst>
+  </p:cSld>
+  <p:clrMapOvr>
+    <a:masterClrMapping/>
+  </p:clrMapOvr>
+</p:sld>
+</file>
+
+<file path=ppt/slides/slide12.xml><?xml version="1.0" encoding="utf-8"?>
+<p:sld xmlns:a="http://schemas.openxmlformats.org/drawingml/2006/main" xmlns:r="http://schemas.openxmlformats.org/officeDocument/2006/relationships" xmlns:p="http://schemas.openxmlformats.org/presentationml/2006/main">
+  <p:cSld>
+    <p:spTree>
+      <p:nvGrpSpPr>
+        <p:cNvPr id="1" name=""/>
+        <p:cNvGrpSpPr/>
+        <p:nvPr/>
+      </p:nvGrpSpPr>
+      <p:grpSpPr>
+        <a:xfrm>
+          <a:off x="0" y="0"/>
+          <a:ext cx="0" cy="0"/>
+          <a:chOff x="0" y="0"/>
+          <a:chExt cx="0" cy="0"/>
+        </a:xfrm>
+      </p:grpSpPr>
       <mc:AlternateContent xmlns:mc="http://schemas.openxmlformats.org/markup-compatibility/2006" xmlns:a14="http://schemas.microsoft.com/office/drawing/2010/main">
         <mc:Choice Requires="a14">
           <p:sp>
@@ -24031,7 +24453,7 @@
 </p:sld>
 </file>
 
-<file path=ppt/slides/slide11.xml><?xml version="1.0" encoding="utf-8"?>
+<file path=ppt/slides/slide13.xml><?xml version="1.0" encoding="utf-8"?>
 <p:sld xmlns:a="http://schemas.openxmlformats.org/drawingml/2006/main" xmlns:r="http://schemas.openxmlformats.org/officeDocument/2006/relationships" xmlns:p="http://schemas.openxmlformats.org/presentationml/2006/main">
   <p:cSld>
     <p:spTree>
@@ -24071,11 +24493,13 @@
           <a:p>
             <a:r>
               <a:rPr lang="en-US" dirty="0"/>
-              <a:t>Combining a multi-scenario extreme weather simulator and building energy modeling to develop a diverse array of future climate states of the world for the next </a:t>
+              <a:t>Combining a multi-scenario extreme weather simulator and building energy modeling to develop a diverse array of future climate states of the world for the next 40 years</a:t>
             </a:r>
+          </a:p>
+          <a:p>
             <a:r>
-              <a:rPr lang="en-US"/>
-              <a:t>40 years</a:t>
+              <a:rPr lang="en-US" dirty="0"/>
+              <a:t>Based on a TMY for the specified location</a:t>
             </a:r>
           </a:p>
           <a:p>
@@ -24129,7 +24553,665 @@
 </p:sld>
 </file>
 
+<file path=ppt/slides/slide14.xml><?xml version="1.0" encoding="utf-8"?>
+<p:sld xmlns:a="http://schemas.openxmlformats.org/drawingml/2006/main" xmlns:r="http://schemas.openxmlformats.org/officeDocument/2006/relationships" xmlns:p="http://schemas.openxmlformats.org/presentationml/2006/main">
+  <p:cSld>
+    <p:spTree>
+      <p:nvGrpSpPr>
+        <p:cNvPr id="1" name=""/>
+        <p:cNvGrpSpPr/>
+        <p:nvPr/>
+      </p:nvGrpSpPr>
+      <p:grpSpPr>
+        <a:xfrm>
+          <a:off x="0" y="0"/>
+          <a:ext cx="0" cy="0"/>
+          <a:chOff x="0" y="0"/>
+          <a:chExt cx="0" cy="0"/>
+        </a:xfrm>
+      </p:grpSpPr>
+      <p:sp>
+        <p:nvSpPr>
+          <p:cNvPr id="2" name="Content Placeholder 1">
+            <a:extLst>
+              <a:ext uri="{FF2B5EF4-FFF2-40B4-BE49-F238E27FC236}">
+                <a16:creationId xmlns:a16="http://schemas.microsoft.com/office/drawing/2014/main" id="{1A1D7C65-4F73-495B-97A3-3C5CFBE1ACFC}"/>
+              </a:ext>
+            </a:extLst>
+          </p:cNvPr>
+          <p:cNvSpPr>
+            <a:spLocks noGrp="1"/>
+          </p:cNvSpPr>
+          <p:nvPr>
+            <p:ph idx="1"/>
+          </p:nvPr>
+        </p:nvSpPr>
+        <p:spPr/>
+        <p:txBody>
+          <a:bodyPr>
+            <a:normAutofit/>
+          </a:bodyPr>
+          <a:lstStyle/>
+          <a:p>
+            <a:r>
+              <a:rPr lang="en-US" dirty="0"/>
+              <a:t>Stakeholder type: </a:t>
+            </a:r>
+          </a:p>
+          <a:p>
+            <a:r>
+              <a:rPr lang="en-US" dirty="0"/>
+              <a:t>Year(s): 2017-present</a:t>
+            </a:r>
+          </a:p>
+          <a:p>
+            <a:r>
+              <a:rPr lang="en-US" dirty="0"/>
+              <a:t>Location: Butte County, CA</a:t>
+            </a:r>
+          </a:p>
+          <a:p>
+            <a:r>
+              <a:rPr lang="en-US" dirty="0"/>
+              <a:t>Relevant natural disaster: wildfires</a:t>
+            </a:r>
+          </a:p>
+          <a:p>
+            <a:r>
+              <a:rPr lang="en-US" dirty="0"/>
+              <a:t>Building characteristics:</a:t>
+            </a:r>
+          </a:p>
+          <a:p>
+            <a:pPr lvl="1"/>
+            <a:r>
+              <a:rPr lang="en-US" dirty="0"/>
+              <a:t>Primary mission:</a:t>
+            </a:r>
+          </a:p>
+          <a:p>
+            <a:pPr lvl="1"/>
+            <a:r>
+              <a:rPr lang="en-US" dirty="0"/>
+              <a:t>Size:</a:t>
+            </a:r>
+          </a:p>
+          <a:p>
+            <a:r>
+              <a:rPr lang="en-US" dirty="0"/>
+              <a:t>Concerns:</a:t>
+            </a:r>
+          </a:p>
+          <a:p>
+            <a:pPr lvl="1"/>
+            <a:r>
+              <a:rPr lang="en-US" dirty="0" err="1"/>
+              <a:t>Slkdfj</a:t>
+            </a:r>
+            <a:endParaRPr lang="en-US" dirty="0"/>
+          </a:p>
+          <a:p>
+            <a:pPr lvl="1"/>
+            <a:r>
+              <a:rPr lang="en-US" dirty="0" err="1"/>
+              <a:t>Slkdjf</a:t>
+            </a:r>
+            <a:endParaRPr lang="en-US" dirty="0"/>
+          </a:p>
+          <a:p>
+            <a:pPr lvl="1"/>
+            <a:r>
+              <a:rPr lang="en-US" dirty="0" err="1"/>
+              <a:t>Sldkjf</a:t>
+            </a:r>
+            <a:endParaRPr lang="en-US" dirty="0"/>
+          </a:p>
+          <a:p>
+            <a:endParaRPr lang="en-US" dirty="0"/>
+          </a:p>
+        </p:txBody>
+      </p:sp>
+      <p:sp>
+        <p:nvSpPr>
+          <p:cNvPr id="3" name="Title 2">
+            <a:extLst>
+              <a:ext uri="{FF2B5EF4-FFF2-40B4-BE49-F238E27FC236}">
+                <a16:creationId xmlns:a16="http://schemas.microsoft.com/office/drawing/2014/main" id="{6276DE62-B85C-45CB-9902-654B2E08CDA0}"/>
+              </a:ext>
+            </a:extLst>
+          </p:cNvPr>
+          <p:cNvSpPr>
+            <a:spLocks noGrp="1"/>
+          </p:cNvSpPr>
+          <p:nvPr>
+            <p:ph type="title"/>
+          </p:nvPr>
+        </p:nvSpPr>
+        <p:spPr/>
+        <p:txBody>
+          <a:bodyPr/>
+          <a:lstStyle/>
+          <a:p>
+            <a:r>
+              <a:rPr lang="en-US" dirty="0"/>
+              <a:t>Customer #2</a:t>
+            </a:r>
+          </a:p>
+        </p:txBody>
+      </p:sp>
+    </p:spTree>
+    <p:extLst>
+      <p:ext uri="{BB962C8B-B14F-4D97-AF65-F5344CB8AC3E}">
+        <p14:creationId xmlns:p14="http://schemas.microsoft.com/office/powerpoint/2010/main" val="3819892273"/>
+      </p:ext>
+    </p:extLst>
+  </p:cSld>
+  <p:clrMapOvr>
+    <a:masterClrMapping/>
+  </p:clrMapOvr>
+</p:sld>
+</file>
+
 <file path=ppt/slides/slide2.xml><?xml version="1.0" encoding="utf-8"?>
+<p:sld xmlns:a="http://schemas.openxmlformats.org/drawingml/2006/main" xmlns:r="http://schemas.openxmlformats.org/officeDocument/2006/relationships" xmlns:p="http://schemas.openxmlformats.org/presentationml/2006/main">
+  <p:cSld>
+    <p:spTree>
+      <p:nvGrpSpPr>
+        <p:cNvPr id="1" name=""/>
+        <p:cNvGrpSpPr/>
+        <p:nvPr/>
+      </p:nvGrpSpPr>
+      <p:grpSpPr>
+        <a:xfrm>
+          <a:off x="0" y="0"/>
+          <a:ext cx="0" cy="0"/>
+          <a:chOff x="0" y="0"/>
+          <a:chExt cx="0" cy="0"/>
+        </a:xfrm>
+      </p:grpSpPr>
+      <p:grpSp>
+        <p:nvGrpSpPr>
+          <p:cNvPr id="62" name="Group 61">
+            <a:extLst>
+              <a:ext uri="{FF2B5EF4-FFF2-40B4-BE49-F238E27FC236}">
+                <a16:creationId xmlns:a16="http://schemas.microsoft.com/office/drawing/2014/main" id="{879A1A43-4754-460B-AFCD-5C7E1E6549D6}"/>
+              </a:ext>
+            </a:extLst>
+          </p:cNvPr>
+          <p:cNvGrpSpPr/>
+          <p:nvPr/>
+        </p:nvGrpSpPr>
+        <p:grpSpPr>
+          <a:xfrm>
+            <a:off x="101883" y="116796"/>
+            <a:ext cx="3102678" cy="1298331"/>
+            <a:chOff x="2944246" y="459299"/>
+            <a:chExt cx="2111699" cy="1922272"/>
+          </a:xfrm>
+        </p:grpSpPr>
+        <p:sp>
+          <p:nvSpPr>
+            <p:cNvPr id="61" name="Rectangle 60">
+              <a:extLst>
+                <a:ext uri="{FF2B5EF4-FFF2-40B4-BE49-F238E27FC236}">
+                  <a16:creationId xmlns:a16="http://schemas.microsoft.com/office/drawing/2014/main" id="{27029419-B179-43D4-9FBD-C2A8FB666F86}"/>
+                </a:ext>
+              </a:extLst>
+            </p:cNvPr>
+            <p:cNvSpPr/>
+            <p:nvPr/>
+          </p:nvSpPr>
+          <p:spPr>
+            <a:xfrm>
+              <a:off x="2944246" y="459299"/>
+              <a:ext cx="2111699" cy="1922272"/>
+            </a:xfrm>
+            <a:prstGeom prst="rect">
+              <a:avLst/>
+            </a:prstGeom>
+            <a:solidFill>
+              <a:srgbClr val="4EA6DC">
+                <a:alpha val="40000"/>
+              </a:srgbClr>
+            </a:solidFill>
+            <a:ln>
+              <a:solidFill>
+                <a:srgbClr val="4EA6DC"/>
+              </a:solidFill>
+            </a:ln>
+          </p:spPr>
+          <p:style>
+            <a:lnRef idx="1">
+              <a:schemeClr val="accent3"/>
+            </a:lnRef>
+            <a:fillRef idx="2">
+              <a:schemeClr val="accent3"/>
+            </a:fillRef>
+            <a:effectRef idx="1">
+              <a:schemeClr val="accent3"/>
+            </a:effectRef>
+            <a:fontRef idx="minor">
+              <a:schemeClr val="dk1"/>
+            </a:fontRef>
+          </p:style>
+          <p:txBody>
+            <a:bodyPr rtlCol="0" anchor="t"/>
+            <a:lstStyle/>
+            <a:p>
+              <a:pPr algn="ctr"/>
+              <a:r>
+                <a:rPr lang="en-US" sz="1300" b="1" dirty="0">
+                  <a:solidFill>
+                    <a:schemeClr val="bg1"/>
+                  </a:solidFill>
+                  <a:latin typeface="Arial" panose="020B0604020202020204" pitchFamily="34" charset="0"/>
+                  <a:cs typeface="Arial" panose="020B0604020202020204" pitchFamily="34" charset="0"/>
+                </a:rPr>
+                <a:t>1. Decision Structuring</a:t>
+              </a:r>
+            </a:p>
+            <a:p>
+              <a:endParaRPr lang="en-US" sz="1050" dirty="0">
+                <a:latin typeface="Arial" panose="020B0604020202020204" pitchFamily="34" charset="0"/>
+                <a:cs typeface="Arial" panose="020B0604020202020204" pitchFamily="34" charset="0"/>
+              </a:endParaRPr>
+            </a:p>
+            <a:p>
+              <a:pPr algn="ctr"/>
+              <a:endParaRPr lang="en-US" sz="1050" dirty="0">
+                <a:latin typeface="Arial" panose="020B0604020202020204" pitchFamily="34" charset="0"/>
+                <a:cs typeface="Arial" panose="020B0604020202020204" pitchFamily="34" charset="0"/>
+              </a:endParaRPr>
+            </a:p>
+            <a:p>
+              <a:pPr algn="ctr"/>
+              <a:endParaRPr lang="en-US" sz="1050" dirty="0">
+                <a:latin typeface="Arial" panose="020B0604020202020204" pitchFamily="34" charset="0"/>
+                <a:cs typeface="Arial" panose="020B0604020202020204" pitchFamily="34" charset="0"/>
+              </a:endParaRPr>
+            </a:p>
+            <a:p>
+              <a:pPr algn="ctr"/>
+              <a:endParaRPr lang="en-US" sz="1050" dirty="0">
+                <a:latin typeface="Arial" panose="020B0604020202020204" pitchFamily="34" charset="0"/>
+                <a:cs typeface="Arial" panose="020B0604020202020204" pitchFamily="34" charset="0"/>
+              </a:endParaRPr>
+            </a:p>
+            <a:p>
+              <a:pPr algn="ctr"/>
+              <a:endParaRPr lang="en-US" sz="1050" dirty="0">
+                <a:latin typeface="Arial" panose="020B0604020202020204" pitchFamily="34" charset="0"/>
+                <a:cs typeface="Arial" panose="020B0604020202020204" pitchFamily="34" charset="0"/>
+              </a:endParaRPr>
+            </a:p>
+            <a:p>
+              <a:pPr algn="ctr"/>
+              <a:endParaRPr lang="en-US" sz="1050" dirty="0">
+                <a:latin typeface="Arial" panose="020B0604020202020204" pitchFamily="34" charset="0"/>
+                <a:cs typeface="Arial" panose="020B0604020202020204" pitchFamily="34" charset="0"/>
+              </a:endParaRPr>
+            </a:p>
+            <a:p>
+              <a:pPr algn="ctr"/>
+              <a:endParaRPr lang="en-US" sz="1050" dirty="0">
+                <a:latin typeface="Arial" panose="020B0604020202020204" pitchFamily="34" charset="0"/>
+                <a:cs typeface="Arial" panose="020B0604020202020204" pitchFamily="34" charset="0"/>
+              </a:endParaRPr>
+            </a:p>
+            <a:p>
+              <a:pPr algn="ctr"/>
+              <a:endParaRPr lang="en-US" sz="1050" dirty="0">
+                <a:latin typeface="Arial" panose="020B0604020202020204" pitchFamily="34" charset="0"/>
+                <a:cs typeface="Arial" panose="020B0604020202020204" pitchFamily="34" charset="0"/>
+              </a:endParaRPr>
+            </a:p>
+            <a:p>
+              <a:pPr algn="ctr"/>
+              <a:endParaRPr lang="en-US" sz="1050" dirty="0">
+                <a:latin typeface="Arial" panose="020B0604020202020204" pitchFamily="34" charset="0"/>
+                <a:cs typeface="Arial" panose="020B0604020202020204" pitchFamily="34" charset="0"/>
+              </a:endParaRPr>
+            </a:p>
+            <a:p>
+              <a:pPr algn="ctr"/>
+              <a:endParaRPr lang="en-US" sz="1050" dirty="0">
+                <a:latin typeface="Arial" panose="020B0604020202020204" pitchFamily="34" charset="0"/>
+                <a:cs typeface="Arial" panose="020B0604020202020204" pitchFamily="34" charset="0"/>
+              </a:endParaRPr>
+            </a:p>
+            <a:p>
+              <a:pPr algn="ctr"/>
+              <a:endParaRPr lang="en-US" sz="1050" dirty="0">
+                <a:latin typeface="Arial" panose="020B0604020202020204" pitchFamily="34" charset="0"/>
+                <a:cs typeface="Arial" panose="020B0604020202020204" pitchFamily="34" charset="0"/>
+              </a:endParaRPr>
+            </a:p>
+            <a:p>
+              <a:pPr algn="ctr"/>
+              <a:endParaRPr lang="en-US" sz="1050" dirty="0">
+                <a:latin typeface="Arial" panose="020B0604020202020204" pitchFamily="34" charset="0"/>
+                <a:cs typeface="Arial" panose="020B0604020202020204" pitchFamily="34" charset="0"/>
+              </a:endParaRPr>
+            </a:p>
+          </p:txBody>
+        </p:sp>
+        <p:sp>
+          <p:nvSpPr>
+            <p:cNvPr id="2" name="Rectangle 1">
+              <a:extLst>
+                <a:ext uri="{FF2B5EF4-FFF2-40B4-BE49-F238E27FC236}">
+                  <a16:creationId xmlns:a16="http://schemas.microsoft.com/office/drawing/2014/main" id="{D454B668-78C9-424A-8460-732E0C2B7E82}"/>
+                </a:ext>
+              </a:extLst>
+            </p:cNvPr>
+            <p:cNvSpPr/>
+            <p:nvPr/>
+          </p:nvSpPr>
+          <p:spPr>
+            <a:xfrm>
+              <a:off x="3005004" y="895960"/>
+              <a:ext cx="2006858" cy="1377432"/>
+            </a:xfrm>
+            <a:prstGeom prst="rect">
+              <a:avLst/>
+            </a:prstGeom>
+            <a:ln>
+              <a:solidFill>
+                <a:srgbClr val="4EA6DC"/>
+              </a:solidFill>
+            </a:ln>
+          </p:spPr>
+          <p:style>
+            <a:lnRef idx="2">
+              <a:schemeClr val="accent3">
+                <a:shade val="50000"/>
+              </a:schemeClr>
+            </a:lnRef>
+            <a:fillRef idx="1">
+              <a:schemeClr val="accent3"/>
+            </a:fillRef>
+            <a:effectRef idx="0">
+              <a:schemeClr val="accent3"/>
+            </a:effectRef>
+            <a:fontRef idx="minor">
+              <a:schemeClr val="lt1"/>
+            </a:fontRef>
+          </p:style>
+          <p:txBody>
+            <a:bodyPr rtlCol="0" anchor="t"/>
+            <a:lstStyle/>
+            <a:p>
+              <a:pPr algn="ctr"/>
+              <a:r>
+                <a:rPr lang="en-US" sz="1300" b="1" dirty="0">
+                  <a:latin typeface="Arial" panose="020B0604020202020204" pitchFamily="34" charset="0"/>
+                  <a:cs typeface="Arial" panose="020B0604020202020204" pitchFamily="34" charset="0"/>
+                </a:rPr>
+                <a:t>XLRM Matrix</a:t>
+              </a:r>
+            </a:p>
+            <a:p>
+              <a:r>
+                <a:rPr lang="en-US" sz="1050" b="1" dirty="0">
+                  <a:latin typeface="Arial" panose="020B0604020202020204" pitchFamily="34" charset="0"/>
+                  <a:cs typeface="Arial" panose="020B0604020202020204" pitchFamily="34" charset="0"/>
+                </a:rPr>
+                <a:t>Inputs: </a:t>
+              </a:r>
+              <a:r>
+                <a:rPr lang="en-US" sz="1050" dirty="0">
+                  <a:latin typeface="Arial" panose="020B0604020202020204" pitchFamily="34" charset="0"/>
+                  <a:cs typeface="Arial" panose="020B0604020202020204" pitchFamily="34" charset="0"/>
+                </a:rPr>
+                <a:t>stakeholder consultations</a:t>
+              </a:r>
+            </a:p>
+            <a:p>
+              <a:r>
+                <a:rPr lang="en-US" sz="1050" b="1" dirty="0">
+                  <a:latin typeface="Arial" panose="020B0604020202020204" pitchFamily="34" charset="0"/>
+                  <a:cs typeface="Arial" panose="020B0604020202020204" pitchFamily="34" charset="0"/>
+                </a:rPr>
+                <a:t>Outputs: </a:t>
+              </a:r>
+              <a:r>
+                <a:rPr lang="en-US" sz="1050" dirty="0">
+                  <a:latin typeface="Arial" panose="020B0604020202020204" pitchFamily="34" charset="0"/>
+                  <a:cs typeface="Arial" panose="020B0604020202020204" pitchFamily="34" charset="0"/>
+                </a:rPr>
+                <a:t>uncertainties, levers available, relationships between uncertainties and levers (identifying models), and metrics of success</a:t>
+              </a:r>
+            </a:p>
+          </p:txBody>
+        </p:sp>
+      </p:grpSp>
+      <p:graphicFrame>
+        <p:nvGraphicFramePr>
+          <p:cNvPr id="3" name="Table 3">
+            <a:extLst>
+              <a:ext uri="{FF2B5EF4-FFF2-40B4-BE49-F238E27FC236}">
+                <a16:creationId xmlns:a16="http://schemas.microsoft.com/office/drawing/2014/main" id="{946C57F8-FBAE-42AC-8562-2FAACF18B00F}"/>
+              </a:ext>
+            </a:extLst>
+          </p:cNvPr>
+          <p:cNvGraphicFramePr>
+            <a:graphicFrameLocks noGrp="1"/>
+          </p:cNvGraphicFramePr>
+          <p:nvPr>
+            <p:extLst>
+              <p:ext uri="{D42A27DB-BD31-4B8C-83A1-F6EECF244321}">
+                <p14:modId xmlns:p14="http://schemas.microsoft.com/office/powerpoint/2010/main" val="3130673011"/>
+              </p:ext>
+            </p:extLst>
+          </p:nvPr>
+        </p:nvGraphicFramePr>
+        <p:xfrm>
+          <a:off x="712536" y="1531324"/>
+          <a:ext cx="10766928" cy="5209880"/>
+        </p:xfrm>
+        <a:graphic>
+          <a:graphicData uri="http://schemas.openxmlformats.org/drawingml/2006/table">
+            <a:tbl>
+              <a:tblPr firstRow="1" bandRow="1">
+                <a:tableStyleId>{5C22544A-7EE6-4342-B048-85BDC9FD1C3A}</a:tableStyleId>
+              </a:tblPr>
+              <a:tblGrid>
+                <a:gridCol w="5383464">
+                  <a:extLst>
+                    <a:ext uri="{9D8B030D-6E8A-4147-A177-3AD203B41FA5}">
+                      <a16:colId xmlns:a16="http://schemas.microsoft.com/office/drawing/2014/main" val="1694154490"/>
+                    </a:ext>
+                  </a:extLst>
+                </a:gridCol>
+                <a:gridCol w="5383464">
+                  <a:extLst>
+                    <a:ext uri="{9D8B030D-6E8A-4147-A177-3AD203B41FA5}">
+                      <a16:colId xmlns:a16="http://schemas.microsoft.com/office/drawing/2014/main" val="1545941482"/>
+                    </a:ext>
+                  </a:extLst>
+                </a:gridCol>
+              </a:tblGrid>
+              <a:tr h="2604940">
+                <a:tc>
+                  <a:txBody>
+                    <a:bodyPr/>
+                    <a:lstStyle/>
+                    <a:p>
+                      <a:r>
+                        <a:rPr lang="en-US" dirty="0"/>
+                        <a:t>Uncertainties</a:t>
+                      </a:r>
+                    </a:p>
+                    <a:p>
+                      <a:pPr marL="285750" indent="-285750">
+                        <a:buFont typeface="Arial" panose="020B0604020202020204" pitchFamily="34" charset="0"/>
+                        <a:buChar char="•"/>
+                      </a:pPr>
+                      <a:r>
+                        <a:rPr lang="en-US" sz="1400" b="0" dirty="0"/>
+                        <a:t>Weather/natural </a:t>
+                      </a:r>
+                      <a:r>
+                        <a:rPr lang="en-US" sz="1400" b="0"/>
+                        <a:t>disaster frequency</a:t>
+                      </a:r>
+                      <a:endParaRPr lang="en-US" sz="1400" b="0" dirty="0"/>
+                    </a:p>
+                    <a:p>
+                      <a:pPr marL="285750" indent="-285750">
+                        <a:buFont typeface="Arial" panose="020B0604020202020204" pitchFamily="34" charset="0"/>
+                        <a:buChar char="•"/>
+                      </a:pPr>
+                      <a:endParaRPr lang="en-US" sz="1400" b="0"/>
+                    </a:p>
+                  </a:txBody>
+                  <a:tcPr>
+                    <a:solidFill>
+                      <a:srgbClr val="4EA6DC">
+                        <a:alpha val="40000"/>
+                      </a:srgbClr>
+                    </a:solidFill>
+                  </a:tcPr>
+                </a:tc>
+                <a:tc>
+                  <a:txBody>
+                    <a:bodyPr/>
+                    <a:lstStyle/>
+                    <a:p>
+                      <a:r>
+                        <a:rPr lang="en-US" dirty="0"/>
+                        <a:t>Levers</a:t>
+                      </a:r>
+                    </a:p>
+                    <a:p>
+                      <a:pPr marL="285750" indent="-285750">
+                        <a:buFont typeface="Arial" panose="020B0604020202020204" pitchFamily="34" charset="0"/>
+                        <a:buChar char="•"/>
+                      </a:pPr>
+                      <a:r>
+                        <a:rPr lang="en-US" sz="1400" b="0" dirty="0"/>
+                        <a:t>Hi</a:t>
+                      </a:r>
+                    </a:p>
+                  </a:txBody>
+                  <a:tcPr>
+                    <a:solidFill>
+                      <a:srgbClr val="4EA6DC">
+                        <a:alpha val="40000"/>
+                      </a:srgbClr>
+                    </a:solidFill>
+                  </a:tcPr>
+                </a:tc>
+                <a:extLst>
+                  <a:ext uri="{0D108BD9-81ED-4DB2-BD59-A6C34878D82A}">
+                    <a16:rowId xmlns:a16="http://schemas.microsoft.com/office/drawing/2014/main" val="1580885338"/>
+                  </a:ext>
+                </a:extLst>
+              </a:tr>
+              <a:tr h="2604940">
+                <a:tc>
+                  <a:txBody>
+                    <a:bodyPr/>
+                    <a:lstStyle/>
+                    <a:p>
+                      <a:r>
+                        <a:rPr lang="en-US" b="1" dirty="0">
+                          <a:solidFill>
+                            <a:schemeClr val="bg1"/>
+                          </a:solidFill>
+                        </a:rPr>
+                        <a:t>Relationships between uncertainties and levers</a:t>
+                      </a:r>
+                    </a:p>
+                    <a:p>
+                      <a:pPr marL="285750" indent="-285750">
+                        <a:buFont typeface="Arial" panose="020B0604020202020204" pitchFamily="34" charset="0"/>
+                        <a:buChar char="•"/>
+                      </a:pPr>
+                      <a:r>
+                        <a:rPr lang="en-US" sz="1400" b="0" dirty="0">
+                          <a:solidFill>
+                            <a:schemeClr val="bg1"/>
+                          </a:solidFill>
+                        </a:rPr>
+                        <a:t>Hi</a:t>
+                      </a:r>
+                    </a:p>
+                  </a:txBody>
+                  <a:tcPr>
+                    <a:solidFill>
+                      <a:srgbClr val="4EA6DC">
+                        <a:alpha val="40000"/>
+                      </a:srgbClr>
+                    </a:solidFill>
+                  </a:tcPr>
+                </a:tc>
+                <a:tc>
+                  <a:txBody>
+                    <a:bodyPr/>
+                    <a:lstStyle/>
+                    <a:p>
+                      <a:r>
+                        <a:rPr lang="en-US" b="1" dirty="0">
+                          <a:solidFill>
+                            <a:schemeClr val="bg1"/>
+                          </a:solidFill>
+                        </a:rPr>
+                        <a:t>Metrics of success</a:t>
+                      </a:r>
+                    </a:p>
+                    <a:p>
+                      <a:pPr marL="285750" indent="-285750">
+                        <a:buFont typeface="Arial" panose="020B0604020202020204" pitchFamily="34" charset="0"/>
+                        <a:buChar char="•"/>
+                      </a:pPr>
+                      <a:r>
+                        <a:rPr lang="en-US" sz="1400" b="0" dirty="0">
+                          <a:solidFill>
+                            <a:schemeClr val="bg1"/>
+                          </a:solidFill>
+                        </a:rPr>
+                        <a:t>Hi</a:t>
+                      </a:r>
+                    </a:p>
+                  </a:txBody>
+                  <a:tcPr>
+                    <a:solidFill>
+                      <a:srgbClr val="4EA6DC">
+                        <a:alpha val="40000"/>
+                      </a:srgbClr>
+                    </a:solidFill>
+                  </a:tcPr>
+                </a:tc>
+                <a:extLst>
+                  <a:ext uri="{0D108BD9-81ED-4DB2-BD59-A6C34878D82A}">
+                    <a16:rowId xmlns:a16="http://schemas.microsoft.com/office/drawing/2014/main" val="1892920487"/>
+                  </a:ext>
+                </a:extLst>
+              </a:tr>
+            </a:tbl>
+          </a:graphicData>
+        </a:graphic>
+      </p:graphicFrame>
+    </p:spTree>
+    <p:extLst>
+      <p:ext uri="{BB962C8B-B14F-4D97-AF65-F5344CB8AC3E}">
+        <p14:creationId xmlns:p14="http://schemas.microsoft.com/office/powerpoint/2010/main" val="1917919274"/>
+      </p:ext>
+    </p:extLst>
+  </p:cSld>
+  <p:clrMapOvr>
+    <a:masterClrMapping/>
+  </p:clrMapOvr>
+  <p:extLst>
+    <p:ext uri="{6950BFC3-D8DA-4A85-94F7-54DA5524770B}">
+      <p188:commentRel xmlns:p188="http://schemas.microsoft.com/office/powerpoint/2018/8/main" r:id="rId3"/>
+    </p:ext>
+  </p:extLst>
+</p:sld>
+</file>
+
+<file path=ppt/slides/slide3.xml><?xml version="1.0" encoding="utf-8"?>
 <p:sld xmlns:a="http://schemas.openxmlformats.org/drawingml/2006/main" xmlns:r="http://schemas.openxmlformats.org/officeDocument/2006/relationships" xmlns:p="http://schemas.openxmlformats.org/presentationml/2006/main">
   <p:cSld>
     <p:spTree>
@@ -24230,7 +25312,7 @@
 </p:sld>
 </file>
 
-<file path=ppt/slides/slide3.xml><?xml version="1.0" encoding="utf-8"?>
+<file path=ppt/slides/slide4.xml><?xml version="1.0" encoding="utf-8"?>
 <p:sld xmlns:a="http://schemas.openxmlformats.org/drawingml/2006/main" xmlns:r="http://schemas.openxmlformats.org/officeDocument/2006/relationships" xmlns:p="http://schemas.openxmlformats.org/presentationml/2006/main">
   <p:cSld>
     <p:spTree>
@@ -24316,7 +25398,7 @@
 </p:sld>
 </file>
 
-<file path=ppt/slides/slide4.xml><?xml version="1.0" encoding="utf-8"?>
+<file path=ppt/slides/slide5.xml><?xml version="1.0" encoding="utf-8"?>
 <p:sld xmlns:a="http://schemas.openxmlformats.org/drawingml/2006/main" xmlns:r="http://schemas.openxmlformats.org/officeDocument/2006/relationships" xmlns:p="http://schemas.openxmlformats.org/presentationml/2006/main">
   <p:cSld>
     <p:spTree>
@@ -24441,7 +25523,7 @@
 </p:sld>
 </file>
 
-<file path=ppt/slides/slide5.xml><?xml version="1.0" encoding="utf-8"?>
+<file path=ppt/slides/slide6.xml><?xml version="1.0" encoding="utf-8"?>
 <p:sld xmlns:a="http://schemas.openxmlformats.org/drawingml/2006/main" xmlns:r="http://schemas.openxmlformats.org/officeDocument/2006/relationships" xmlns:p="http://schemas.openxmlformats.org/presentationml/2006/main">
   <p:cSld>
     <p:spTree>
@@ -24608,7 +25690,7 @@
 </p:sld>
 </file>
 
-<file path=ppt/slides/slide6.xml><?xml version="1.0" encoding="utf-8"?>
+<file path=ppt/slides/slide7.xml><?xml version="1.0" encoding="utf-8"?>
 <p:sld xmlns:a="http://schemas.openxmlformats.org/drawingml/2006/main" xmlns:r="http://schemas.openxmlformats.org/officeDocument/2006/relationships" xmlns:p="http://schemas.openxmlformats.org/presentationml/2006/main">
   <p:cSld>
     <p:spTree>
@@ -24666,7 +25748,7 @@
 </p:sld>
 </file>
 
-<file path=ppt/slides/slide7.xml><?xml version="1.0" encoding="utf-8"?>
+<file path=ppt/slides/slide8.xml><?xml version="1.0" encoding="utf-8"?>
 <p:sld xmlns:a="http://schemas.openxmlformats.org/drawingml/2006/main" xmlns:r="http://schemas.openxmlformats.org/officeDocument/2006/relationships" xmlns:p="http://schemas.openxmlformats.org/presentationml/2006/main">
   <p:cSld>
     <p:spTree>
@@ -24798,7 +25880,7 @@
 </p:sld>
 </file>
 
-<file path=ppt/slides/slide8.xml><?xml version="1.0" encoding="utf-8"?>
+<file path=ppt/slides/slide9.xml><?xml version="1.0" encoding="utf-8"?>
 <p:sld xmlns:a="http://schemas.openxmlformats.org/drawingml/2006/main" xmlns:r="http://schemas.openxmlformats.org/officeDocument/2006/relationships" xmlns:p="http://schemas.openxmlformats.org/presentationml/2006/main">
   <p:cSld>
     <p:spTree>
@@ -24958,64 +26040,6 @@
     <p:extLst>
       <p:ext uri="{BB962C8B-B14F-4D97-AF65-F5344CB8AC3E}">
         <p14:creationId xmlns:p14="http://schemas.microsoft.com/office/powerpoint/2010/main" val="884893291"/>
-      </p:ext>
-    </p:extLst>
-  </p:cSld>
-  <p:clrMapOvr>
-    <a:masterClrMapping/>
-  </p:clrMapOvr>
-</p:sld>
-</file>
-
-<file path=ppt/slides/slide9.xml><?xml version="1.0" encoding="utf-8"?>
-<p:sld xmlns:a="http://schemas.openxmlformats.org/drawingml/2006/main" xmlns:r="http://schemas.openxmlformats.org/officeDocument/2006/relationships" xmlns:p="http://schemas.openxmlformats.org/presentationml/2006/main">
-  <p:cSld>
-    <p:spTree>
-      <p:nvGrpSpPr>
-        <p:cNvPr id="1" name=""/>
-        <p:cNvGrpSpPr/>
-        <p:nvPr/>
-      </p:nvGrpSpPr>
-      <p:grpSpPr>
-        <a:xfrm>
-          <a:off x="0" y="0"/>
-          <a:ext cx="0" cy="0"/>
-          <a:chOff x="0" y="0"/>
-          <a:chExt cx="0" cy="0"/>
-        </a:xfrm>
-      </p:grpSpPr>
-      <p:sp>
-        <p:nvSpPr>
-          <p:cNvPr id="2" name="Title 1">
-            <a:extLst>
-              <a:ext uri="{FF2B5EF4-FFF2-40B4-BE49-F238E27FC236}">
-                <a16:creationId xmlns:a16="http://schemas.microsoft.com/office/drawing/2014/main" id="{AC0175D7-7AE2-44E6-81F4-93B23E3EACCF}"/>
-              </a:ext>
-            </a:extLst>
-          </p:cNvPr>
-          <p:cNvSpPr>
-            <a:spLocks noGrp="1"/>
-          </p:cNvSpPr>
-          <p:nvPr>
-            <p:ph type="title"/>
-          </p:nvPr>
-        </p:nvSpPr>
-        <p:spPr/>
-        <p:txBody>
-          <a:bodyPr/>
-          <a:lstStyle/>
-          <a:p>
-            <a:r>
-              <a:rPr lang="en-US" dirty="0"/>
-              <a:t>Stakeholder Concerns</a:t>
-            </a:r>
-          </a:p>
-        </p:txBody>
-      </p:sp>
-    </p:spTree>
-    <p:extLst>
-      <p:ext uri="{BB962C8B-B14F-4D97-AF65-F5344CB8AC3E}">
-        <p14:creationId xmlns:p14="http://schemas.microsoft.com/office/powerpoint/2010/main" val="2154757565"/>
       </p:ext>
     </p:extLst>
   </p:cSld>

</xml_diff>